<commit_message>
added github link to pptx
</commit_message>
<xml_diff>
--- a/BicepIntro.pptx
+++ b/BicepIntro.pptx
@@ -357,7 +357,7 @@
             <a:pPr indent="0" algn="r">
               <a:buNone/>
             </a:pPr>
-            <a:fld id="{3545D0B2-222A-4FAA-8D22-C5CEE1A3D721}" type="slidenum">
+            <a:fld id="{D45E4C91-7A97-4261-968F-2134E271454F}" type="slidenum">
               <a:rPr b="0" lang="en-US" sz="1400" spc="-1" strike="noStrike">
                 <a:solidFill>
                   <a:srgbClr val="000000"/>
@@ -400,7 +400,7 @@
       </p:grpSpPr>
       <p:sp>
         <p:nvSpPr>
-          <p:cNvPr id="100" name="PlaceHolder 1"/>
+          <p:cNvPr id="101" name="PlaceHolder 1"/>
           <p:cNvSpPr>
             <a:spLocks noGrp="1"/>
           </p:cNvSpPr>
@@ -411,7 +411,7 @@
         <p:spPr>
           <a:xfrm>
             <a:off x="685800" y="1143000"/>
-            <a:ext cx="5485680" cy="3085560"/>
+            <a:ext cx="5485320" cy="3085200"/>
           </a:xfrm>
           <a:prstGeom prst="rect">
             <a:avLst/>
@@ -423,7 +423,7 @@
       </p:sp>
       <p:sp>
         <p:nvSpPr>
-          <p:cNvPr id="101" name="PlaceHolder 2"/>
+          <p:cNvPr id="102" name="PlaceHolder 2"/>
           <p:cNvSpPr>
             <a:spLocks noGrp="1"/>
           </p:cNvSpPr>
@@ -434,7 +434,7 @@
         <p:spPr>
           <a:xfrm>
             <a:off x="685800" y="4400640"/>
-            <a:ext cx="5485680" cy="3599640"/>
+            <a:ext cx="5485320" cy="3599280"/>
           </a:xfrm>
           <a:prstGeom prst="rect">
             <a:avLst/>
@@ -463,7 +463,7 @@
       </p:sp>
       <p:sp>
         <p:nvSpPr>
-          <p:cNvPr id="102" name="PlaceHolder 3"/>
+          <p:cNvPr id="103" name="PlaceHolder 3"/>
           <p:cNvSpPr>
             <a:spLocks noGrp="1"/>
           </p:cNvSpPr>
@@ -474,7 +474,7 @@
         <p:spPr>
           <a:xfrm>
             <a:off x="3884760" y="8685360"/>
-            <a:ext cx="2971080" cy="457920"/>
+            <a:ext cx="2970720" cy="457560"/>
           </a:xfrm>
           <a:prstGeom prst="rect">
             <a:avLst/>
@@ -515,7 +515,7 @@
                 <a:tab algn="l" pos="0"/>
               </a:tabLst>
             </a:pPr>
-            <a:fld id="{7366C6F0-C381-4A8A-9D12-93DF97A9DC80}" type="slidenum">
+            <a:fld id="{02146A0A-BE8D-444F-A50D-51539A9C4DCB}" type="slidenum">
               <a:rPr b="0" lang="en-US" sz="1200" spc="-1" strike="noStrike">
                 <a:solidFill>
                   <a:srgbClr val="000000"/>
@@ -557,7 +557,7 @@
       </p:grpSpPr>
       <p:sp>
         <p:nvSpPr>
-          <p:cNvPr id="103" name="PlaceHolder 1"/>
+          <p:cNvPr id="104" name="PlaceHolder 1"/>
           <p:cNvSpPr>
             <a:spLocks noGrp="1"/>
           </p:cNvSpPr>
@@ -568,7 +568,7 @@
         <p:spPr>
           <a:xfrm>
             <a:off x="685800" y="1143000"/>
-            <a:ext cx="5485680" cy="3085560"/>
+            <a:ext cx="5485320" cy="3085200"/>
           </a:xfrm>
           <a:prstGeom prst="rect">
             <a:avLst/>
@@ -580,7 +580,7 @@
       </p:sp>
       <p:sp>
         <p:nvSpPr>
-          <p:cNvPr id="104" name="PlaceHolder 2"/>
+          <p:cNvPr id="105" name="PlaceHolder 2"/>
           <p:cNvSpPr>
             <a:spLocks noGrp="1"/>
           </p:cNvSpPr>
@@ -591,7 +591,7 @@
         <p:spPr>
           <a:xfrm>
             <a:off x="685800" y="4400640"/>
-            <a:ext cx="5485680" cy="3599640"/>
+            <a:ext cx="5485320" cy="3599280"/>
           </a:xfrm>
           <a:prstGeom prst="rect">
             <a:avLst/>
@@ -620,7 +620,7 @@
       </p:sp>
       <p:sp>
         <p:nvSpPr>
-          <p:cNvPr id="105" name="PlaceHolder 3"/>
+          <p:cNvPr id="106" name="PlaceHolder 3"/>
           <p:cNvSpPr>
             <a:spLocks noGrp="1"/>
           </p:cNvSpPr>
@@ -631,7 +631,7 @@
         <p:spPr>
           <a:xfrm>
             <a:off x="3884760" y="8685360"/>
-            <a:ext cx="2971080" cy="457920"/>
+            <a:ext cx="2970720" cy="457560"/>
           </a:xfrm>
           <a:prstGeom prst="rect">
             <a:avLst/>
@@ -672,7 +672,7 @@
                 <a:tab algn="l" pos="0"/>
               </a:tabLst>
             </a:pPr>
-            <a:fld id="{64F0B622-B227-48DB-8E94-53810738A52C}" type="slidenum">
+            <a:fld id="{D8F93743-B8E0-4C81-9077-00242D279B22}" type="slidenum">
               <a:rPr b="0" lang="en-US" sz="1200" spc="-1" strike="noStrike">
                 <a:solidFill>
                   <a:srgbClr val="000000"/>
@@ -768,7 +768,7 @@
         <p:txBody>
           <a:bodyPr/>
           <a:p>
-            <a:fld id="{7DDF4E64-0FE2-42A9-8625-A45343449BB1}" type="slidenum">
+            <a:fld id="{F14B8DFF-6031-401C-8B07-1D22D7AAE8BB}" type="slidenum">
               <a:t>&lt;#&gt;</a:t>
             </a:fld>
           </a:p>
@@ -851,7 +851,7 @@
         <p:txBody>
           <a:bodyPr/>
           <a:p>
-            <a:fld id="{2F5B6A9D-9B03-4588-A146-5B20691B721E}" type="slidenum">
+            <a:fld id="{71BDED65-2E7F-4E11-AA08-4784547C9618}" type="slidenum">
               <a:t>&lt;#&gt;</a:t>
             </a:fld>
           </a:p>
@@ -1017,7 +1017,7 @@
         <p:txBody>
           <a:bodyPr/>
           <a:p>
-            <a:fld id="{8CEE5403-B3EA-4AA3-875F-F9D7E303BF94}" type="slidenum">
+            <a:fld id="{A7238856-8B70-44F5-9E4A-3C1439D97F2C}" type="slidenum">
               <a:t>&lt;#&gt;</a:t>
             </a:fld>
           </a:p>
@@ -1100,7 +1100,7 @@
         <p:txBody>
           <a:bodyPr/>
           <a:p>
-            <a:fld id="{C26FE653-BAF1-4973-A6D9-61901F65E644}" type="slidenum">
+            <a:fld id="{A02BA02D-447F-4128-A782-CB8CA6401F33}" type="slidenum">
               <a:t>&lt;#&gt;</a:t>
             </a:fld>
           </a:p>
@@ -1183,7 +1183,7 @@
         <p:txBody>
           <a:bodyPr/>
           <a:p>
-            <a:fld id="{96B18B35-3542-4B66-8E37-BC239E25FDC1}" type="slidenum">
+            <a:fld id="{7D92864A-C615-4A7F-9838-022DAD7A9EEC}" type="slidenum">
               <a:t>&lt;#&gt;</a:t>
             </a:fld>
           </a:p>
@@ -1266,7 +1266,7 @@
         <p:txBody>
           <a:bodyPr/>
           <a:p>
-            <a:fld id="{B48AF374-790E-4484-84EB-82A9A0F2D6F0}" type="slidenum">
+            <a:fld id="{1A5C570E-7F2C-4D37-9512-AA7632B110BF}" type="slidenum">
               <a:t>&lt;#&gt;</a:t>
             </a:fld>
           </a:p>
@@ -1329,7 +1329,7 @@
         <p:txBody>
           <a:bodyPr/>
           <a:p>
-            <a:fld id="{D3E37136-2C39-40C7-842C-7509F79F96CE}" type="slidenum">
+            <a:fld id="{09609C37-794C-4831-A394-07E9879744A5}" type="slidenum">
               <a:t>&lt;#&gt;</a:t>
             </a:fld>
           </a:p>
@@ -1517,7 +1517,7 @@
         <p:txBody>
           <a:bodyPr/>
           <a:p>
-            <a:fld id="{FCFE0800-EAA6-4EFA-A2FC-C0D113E96BA7}" type="slidenum">
+            <a:fld id="{0DB61A0D-48B7-4937-AF63-93D9717DC4AF}" type="slidenum">
               <a:t>&lt;#&gt;</a:t>
             </a:fld>
           </a:p>
@@ -1580,7 +1580,7 @@
         <p:txBody>
           <a:bodyPr/>
           <a:p>
-            <a:fld id="{C19BE9EE-8022-4A44-874C-9C7042C53766}" type="slidenum">
+            <a:fld id="{F03C2A13-35C8-46DE-866B-508053AABA42}" type="slidenum">
               <a:t>&lt;#&gt;</a:t>
             </a:fld>
           </a:p>
@@ -1663,7 +1663,7 @@
         <p:txBody>
           <a:bodyPr/>
           <a:p>
-            <a:fld id="{252E62D6-6C41-490A-A471-19FBDE680FEA}" type="slidenum">
+            <a:fld id="{5B730E46-FFB0-46BC-B0C9-EE72D0871205}" type="slidenum">
               <a:t>&lt;#&gt;</a:t>
             </a:fld>
           </a:p>
@@ -1728,7 +1728,7 @@
         <p:spPr>
           <a:xfrm>
             <a:off x="0" y="0"/>
-            <a:ext cx="12191400" cy="2264400"/>
+            <a:ext cx="12191040" cy="2264040"/>
           </a:xfrm>
           <a:prstGeom prst="rect">
             <a:avLst/>
@@ -1788,7 +1788,7 @@
         <p:spPr>
           <a:xfrm>
             <a:off x="0" y="0"/>
-            <a:ext cx="7532280" cy="6857280"/>
+            <a:ext cx="7531920" cy="6856920"/>
           </a:xfrm>
           <a:prstGeom prst="rect">
             <a:avLst/>
@@ -2151,7 +2151,7 @@
         <p:spPr>
           <a:xfrm>
             <a:off x="0" y="0"/>
-            <a:ext cx="12191400" cy="2264400"/>
+            <a:ext cx="12191040" cy="2264040"/>
           </a:xfrm>
           <a:prstGeom prst="rect">
             <a:avLst/>
@@ -2209,7 +2209,7 @@
         <p:spPr>
           <a:xfrm>
             <a:off x="960120" y="6356520"/>
-            <a:ext cx="3592800" cy="364320"/>
+            <a:ext cx="3592440" cy="363960"/>
           </a:xfrm>
           <a:prstGeom prst="rect">
             <a:avLst/>
@@ -2281,7 +2281,7 @@
         <p:spPr>
           <a:xfrm>
             <a:off x="10296000" y="6356520"/>
-            <a:ext cx="932040" cy="364320"/>
+            <a:ext cx="931680" cy="363960"/>
           </a:xfrm>
           <a:prstGeom prst="rect">
             <a:avLst/>
@@ -2322,7 +2322,7 @@
                 <a:tab algn="l" pos="0"/>
               </a:tabLst>
             </a:pPr>
-            <a:fld id="{B712CD13-600C-4E44-87FF-DCC2390CA014}" type="slidenum">
+            <a:fld id="{ED8C0B23-6907-4819-87C0-5C9942EFA6F8}" type="slidenum">
               <a:rPr b="0" lang="en-US" sz="1200" spc="-1" strike="noStrike">
                 <a:solidFill>
                   <a:schemeClr val="dk1"/>
@@ -2353,7 +2353,7 @@
         <p:spPr>
           <a:xfrm>
             <a:off x="4477680" y="6356520"/>
-            <a:ext cx="3236400" cy="364320"/>
+            <a:ext cx="3236040" cy="363960"/>
           </a:xfrm>
           <a:prstGeom prst="rect">
             <a:avLst/>
@@ -2442,7 +2442,7 @@
         <p:spPr>
           <a:xfrm>
             <a:off x="0" y="0"/>
-            <a:ext cx="12191400" cy="2264400"/>
+            <a:ext cx="12191040" cy="2264040"/>
           </a:xfrm>
           <a:prstGeom prst="rect">
             <a:avLst/>
@@ -2500,7 +2500,7 @@
         <p:spPr>
           <a:xfrm>
             <a:off x="960120" y="6356520"/>
-            <a:ext cx="3417120" cy="364320"/>
+            <a:ext cx="3416760" cy="363960"/>
           </a:xfrm>
           <a:prstGeom prst="rect">
             <a:avLst/>
@@ -2572,7 +2572,7 @@
         <p:spPr>
           <a:xfrm>
             <a:off x="10296000" y="6356520"/>
-            <a:ext cx="932040" cy="364320"/>
+            <a:ext cx="931680" cy="363960"/>
           </a:xfrm>
           <a:prstGeom prst="rect">
             <a:avLst/>
@@ -2613,7 +2613,7 @@
                 <a:tab algn="l" pos="0"/>
               </a:tabLst>
             </a:pPr>
-            <a:fld id="{9E7D2CFA-AF0F-47C6-9E00-48168F4848B9}" type="slidenum">
+            <a:fld id="{097EE712-9B8D-44F8-A9AE-05B6F2E86803}" type="slidenum">
               <a:rPr b="0" lang="en-US" sz="1200" spc="-1" strike="noStrike">
                 <a:solidFill>
                   <a:schemeClr val="dk1"/>
@@ -2644,7 +2644,7 @@
         <p:spPr>
           <a:xfrm>
             <a:off x="4477680" y="6356520"/>
-            <a:ext cx="3236400" cy="364320"/>
+            <a:ext cx="3236040" cy="363960"/>
           </a:xfrm>
           <a:prstGeom prst="rect">
             <a:avLst/>
@@ -2733,7 +2733,7 @@
         <p:spPr>
           <a:xfrm>
             <a:off x="0" y="0"/>
-            <a:ext cx="12191400" cy="2264400"/>
+            <a:ext cx="12191040" cy="2264040"/>
           </a:xfrm>
           <a:prstGeom prst="rect">
             <a:avLst/>
@@ -2791,8 +2791,8 @@
         </p:nvSpPr>
         <p:spPr>
           <a:xfrm>
-            <a:off x="4555080" y="3036600"/>
-            <a:ext cx="7135200" cy="1699920"/>
+            <a:off x="609480" y="273600"/>
+            <a:ext cx="10972080" cy="1144440"/>
           </a:xfrm>
           <a:prstGeom prst="rect">
             <a:avLst/>
@@ -2840,8 +2840,8 @@
         </p:nvSpPr>
         <p:spPr>
           <a:xfrm>
-            <a:off x="-12960" y="1225440"/>
-            <a:ext cx="4059360" cy="3951000"/>
+            <a:off x="609480" y="1604520"/>
+            <a:ext cx="10972080" cy="3976920"/>
           </a:xfrm>
           <a:prstGeom prst="rect">
             <a:avLst/>
@@ -3066,7 +3066,7 @@
         <p:spPr>
           <a:xfrm>
             <a:off x="960120" y="6356520"/>
-            <a:ext cx="3236400" cy="364320"/>
+            <a:ext cx="3236040" cy="363960"/>
           </a:xfrm>
           <a:prstGeom prst="rect">
             <a:avLst/>
@@ -3138,7 +3138,7 @@
         <p:spPr>
           <a:xfrm>
             <a:off x="10296000" y="6356520"/>
-            <a:ext cx="932040" cy="364320"/>
+            <a:ext cx="931680" cy="363960"/>
           </a:xfrm>
           <a:prstGeom prst="rect">
             <a:avLst/>
@@ -3179,7 +3179,7 @@
                 <a:tab algn="l" pos="0"/>
               </a:tabLst>
             </a:pPr>
-            <a:fld id="{258F0D25-D38A-4C51-B1D3-14DC64100290}" type="slidenum">
+            <a:fld id="{7D48B7D6-744E-4D5F-ABB1-42A8AF62FED5}" type="slidenum">
               <a:rPr b="0" lang="en-US" sz="1200" spc="-1" strike="noStrike">
                 <a:solidFill>
                   <a:schemeClr val="dk1"/>
@@ -3210,7 +3210,7 @@
         <p:spPr>
           <a:xfrm>
             <a:off x="4477680" y="6356520"/>
-            <a:ext cx="3236400" cy="364320"/>
+            <a:ext cx="3236040" cy="363960"/>
           </a:xfrm>
           <a:prstGeom prst="rect">
             <a:avLst/>
@@ -3299,7 +3299,7 @@
         <p:spPr>
           <a:xfrm>
             <a:off x="0" y="0"/>
-            <a:ext cx="12191400" cy="2264400"/>
+            <a:ext cx="12191040" cy="2264040"/>
           </a:xfrm>
           <a:prstGeom prst="rect">
             <a:avLst/>
@@ -3359,7 +3359,7 @@
         <p:spPr>
           <a:xfrm>
             <a:off x="0" y="0"/>
-            <a:ext cx="6093720" cy="6857280"/>
+            <a:ext cx="6093360" cy="6856920"/>
           </a:xfrm>
           <a:prstGeom prst="rect">
             <a:avLst/>
@@ -3417,7 +3417,7 @@
         <p:spPr>
           <a:xfrm>
             <a:off x="960120" y="6356520"/>
-            <a:ext cx="5504040" cy="364320"/>
+            <a:ext cx="5503680" cy="363960"/>
           </a:xfrm>
           <a:prstGeom prst="rect">
             <a:avLst/>
@@ -3489,7 +3489,7 @@
         <p:spPr>
           <a:xfrm>
             <a:off x="10296000" y="6356520"/>
-            <a:ext cx="932040" cy="364320"/>
+            <a:ext cx="931680" cy="363960"/>
           </a:xfrm>
           <a:prstGeom prst="rect">
             <a:avLst/>
@@ -3530,7 +3530,7 @@
                 <a:tab algn="l" pos="0"/>
               </a:tabLst>
             </a:pPr>
-            <a:fld id="{B01E1540-C538-4A7E-873E-A394D86FC240}" type="slidenum">
+            <a:fld id="{2C40474E-53E2-4C88-955A-BB045F6C10EB}" type="slidenum">
               <a:rPr b="0" lang="en-US" sz="1200" spc="-1" strike="noStrike">
                 <a:solidFill>
                   <a:schemeClr val="dk1"/>
@@ -3561,7 +3561,7 @@
         <p:spPr>
           <a:xfrm>
             <a:off x="6903720" y="6356520"/>
-            <a:ext cx="3236400" cy="364320"/>
+            <a:ext cx="3236040" cy="363960"/>
           </a:xfrm>
           <a:prstGeom prst="rect">
             <a:avLst/>
@@ -3924,7 +3924,7 @@
         <p:spPr>
           <a:xfrm>
             <a:off x="0" y="0"/>
-            <a:ext cx="12191400" cy="2264400"/>
+            <a:ext cx="12191040" cy="2264040"/>
           </a:xfrm>
           <a:prstGeom prst="rect">
             <a:avLst/>
@@ -3984,7 +3984,7 @@
         <p:spPr>
           <a:xfrm>
             <a:off x="3990240" y="1225080"/>
-            <a:ext cx="8201160" cy="3951000"/>
+            <a:ext cx="8200800" cy="3950640"/>
           </a:xfrm>
           <a:prstGeom prst="rect">
             <a:avLst/>
@@ -4042,7 +4042,7 @@
         <p:spPr>
           <a:xfrm>
             <a:off x="960120" y="6356520"/>
-            <a:ext cx="3404160" cy="364320"/>
+            <a:ext cx="3403800" cy="363960"/>
           </a:xfrm>
           <a:prstGeom prst="rect">
             <a:avLst/>
@@ -4114,7 +4114,7 @@
         <p:spPr>
           <a:xfrm>
             <a:off x="10296000" y="6356520"/>
-            <a:ext cx="932040" cy="364320"/>
+            <a:ext cx="931680" cy="363960"/>
           </a:xfrm>
           <a:prstGeom prst="rect">
             <a:avLst/>
@@ -4155,7 +4155,7 @@
                 <a:tab algn="l" pos="0"/>
               </a:tabLst>
             </a:pPr>
-            <a:fld id="{710E3A1C-DF85-4781-9BA5-CD32201742B6}" type="slidenum">
+            <a:fld id="{99A4EA24-FF38-4E3E-91CD-916915C439C2}" type="slidenum">
               <a:rPr b="0" lang="en-US" sz="1200" spc="-1" strike="noStrike">
                 <a:solidFill>
                   <a:schemeClr val="dk1"/>
@@ -4186,7 +4186,7 @@
         <p:spPr>
           <a:xfrm>
             <a:off x="4477680" y="6356520"/>
-            <a:ext cx="3236400" cy="364320"/>
+            <a:ext cx="3236040" cy="363960"/>
           </a:xfrm>
           <a:prstGeom prst="rect">
             <a:avLst/>
@@ -4549,7 +4549,7 @@
         <p:spPr>
           <a:xfrm>
             <a:off x="0" y="0"/>
-            <a:ext cx="12191400" cy="2264400"/>
+            <a:ext cx="12191040" cy="2264040"/>
           </a:xfrm>
           <a:prstGeom prst="rect">
             <a:avLst/>
@@ -4609,7 +4609,7 @@
         <p:spPr>
           <a:xfrm>
             <a:off x="0" y="2265120"/>
-            <a:ext cx="5297040" cy="3951360"/>
+            <a:ext cx="5296680" cy="3951000"/>
           </a:xfrm>
           <a:prstGeom prst="rect">
             <a:avLst/>
@@ -4667,7 +4667,7 @@
         <p:spPr>
           <a:xfrm>
             <a:off x="960120" y="6356520"/>
-            <a:ext cx="3352680" cy="364320"/>
+            <a:ext cx="3352320" cy="363960"/>
           </a:xfrm>
           <a:prstGeom prst="rect">
             <a:avLst/>
@@ -4739,7 +4739,7 @@
         <p:spPr>
           <a:xfrm>
             <a:off x="10296000" y="6356520"/>
-            <a:ext cx="932040" cy="364320"/>
+            <a:ext cx="931680" cy="363960"/>
           </a:xfrm>
           <a:prstGeom prst="rect">
             <a:avLst/>
@@ -4780,7 +4780,7 @@
                 <a:tab algn="l" pos="0"/>
               </a:tabLst>
             </a:pPr>
-            <a:fld id="{3AA1DB57-7E87-405F-B22C-580AB9FCD0AA}" type="slidenum">
+            <a:fld id="{FBD8683C-156F-4B62-9D0E-387F97815ADB}" type="slidenum">
               <a:rPr b="0" lang="en-US" sz="1200" spc="-1" strike="noStrike">
                 <a:solidFill>
                   <a:schemeClr val="dk1"/>
@@ -4811,7 +4811,7 @@
         <p:spPr>
           <a:xfrm>
             <a:off x="4477680" y="6356520"/>
-            <a:ext cx="3236400" cy="364320"/>
+            <a:ext cx="3236040" cy="363960"/>
           </a:xfrm>
           <a:prstGeom prst="rect">
             <a:avLst/>
@@ -5174,7 +5174,7 @@
         <p:spPr>
           <a:xfrm>
             <a:off x="0" y="0"/>
-            <a:ext cx="12191400" cy="2264400"/>
+            <a:ext cx="12191040" cy="2264040"/>
           </a:xfrm>
           <a:prstGeom prst="rect">
             <a:avLst/>
@@ -5234,7 +5234,7 @@
         <p:spPr>
           <a:xfrm>
             <a:off x="0" y="0"/>
-            <a:ext cx="6093720" cy="6857280"/>
+            <a:ext cx="6093360" cy="6856920"/>
           </a:xfrm>
           <a:prstGeom prst="rect">
             <a:avLst/>
@@ -5288,7 +5288,7 @@
         <p:spPr>
           <a:xfrm>
             <a:off x="960480" y="6356520"/>
-            <a:ext cx="4980960" cy="364320"/>
+            <a:ext cx="4980600" cy="363960"/>
           </a:xfrm>
           <a:prstGeom prst="rect">
             <a:avLst/>
@@ -5315,7 +5315,7 @@
               </a:lnSpc>
             </a:pPr>
             <a:r>
-              <a:rPr b="0" lang="en-US" sz="1100" spc="46" strike="noStrike" cap="all">
+              <a:rPr b="0" lang="en-US" sz="1100" spc="43" strike="noStrike" cap="all">
                 <a:solidFill>
                   <a:schemeClr val="lt1"/>
                 </a:solidFill>
@@ -5345,7 +5345,7 @@
         <p:spPr>
           <a:xfrm>
             <a:off x="10296000" y="6356520"/>
-            <a:ext cx="932040" cy="364320"/>
+            <a:ext cx="931680" cy="363960"/>
           </a:xfrm>
           <a:prstGeom prst="rect">
             <a:avLst/>
@@ -5386,7 +5386,7 @@
                 <a:tab algn="l" pos="0"/>
               </a:tabLst>
             </a:pPr>
-            <a:fld id="{2CE04B77-8E9D-4E5C-8B8C-F75BC47DEE79}" type="slidenum">
+            <a:fld id="{9E99DF5F-F18F-45BA-AD4B-9706F9C12277}" type="slidenum">
               <a:rPr b="0" lang="en-US" sz="1200" spc="-1" strike="noStrike">
                 <a:solidFill>
                   <a:schemeClr val="dk1"/>
@@ -5417,7 +5417,7 @@
         <p:spPr>
           <a:xfrm>
             <a:off x="6903720" y="6356520"/>
-            <a:ext cx="3236400" cy="364320"/>
+            <a:ext cx="3236040" cy="363960"/>
           </a:xfrm>
           <a:prstGeom prst="rect">
             <a:avLst/>
@@ -5506,7 +5506,7 @@
         <p:spPr>
           <a:xfrm>
             <a:off x="0" y="0"/>
-            <a:ext cx="12191400" cy="2264400"/>
+            <a:ext cx="12191040" cy="2264040"/>
           </a:xfrm>
           <a:prstGeom prst="rect">
             <a:avLst/>
@@ -5566,7 +5566,7 @@
         <p:spPr>
           <a:xfrm>
             <a:off x="0" y="0"/>
-            <a:ext cx="12191400" cy="4224240"/>
+            <a:ext cx="12191040" cy="4223880"/>
           </a:xfrm>
           <a:prstGeom prst="rect">
             <a:avLst/>
@@ -5653,7 +5653,7 @@
         <p:spPr>
           <a:xfrm>
             <a:off x="0" y="0"/>
-            <a:ext cx="12191400" cy="2264400"/>
+            <a:ext cx="12191040" cy="2264040"/>
           </a:xfrm>
           <a:prstGeom prst="rect">
             <a:avLst/>
@@ -5710,8 +5710,8 @@
         </p:nvSpPr>
         <p:spPr>
           <a:xfrm>
-            <a:off x="4555080" y="3036600"/>
-            <a:ext cx="7135200" cy="1699920"/>
+            <a:off x="609480" y="273600"/>
+            <a:ext cx="10972080" cy="1144440"/>
           </a:xfrm>
           <a:prstGeom prst="rect">
             <a:avLst/>
@@ -5759,8 +5759,8 @@
         </p:nvSpPr>
         <p:spPr>
           <a:xfrm>
-            <a:off x="-12960" y="1225440"/>
-            <a:ext cx="4059360" cy="3951000"/>
+            <a:off x="609480" y="1604520"/>
+            <a:ext cx="10972080" cy="3976920"/>
           </a:xfrm>
           <a:prstGeom prst="rect">
             <a:avLst/>
@@ -5985,7 +5985,7 @@
         <p:spPr>
           <a:xfrm>
             <a:off x="960120" y="6356520"/>
-            <a:ext cx="3236400" cy="364320"/>
+            <a:ext cx="3236040" cy="363960"/>
           </a:xfrm>
           <a:prstGeom prst="rect">
             <a:avLst/>
@@ -6057,7 +6057,7 @@
         <p:spPr>
           <a:xfrm>
             <a:off x="10296000" y="6356520"/>
-            <a:ext cx="932040" cy="364320"/>
+            <a:ext cx="931680" cy="363960"/>
           </a:xfrm>
           <a:prstGeom prst="rect">
             <a:avLst/>
@@ -6098,7 +6098,7 @@
                 <a:tab algn="l" pos="0"/>
               </a:tabLst>
             </a:pPr>
-            <a:fld id="{34D8FB49-278E-4D3A-A179-243BE3F81AE6}" type="slidenum">
+            <a:fld id="{1E9B39DE-4F31-4601-8BFB-97BBBEED1D00}" type="slidenum">
               <a:rPr b="0" lang="en-US" sz="1200" spc="-1" strike="noStrike">
                 <a:solidFill>
                   <a:schemeClr val="dk1"/>
@@ -6129,7 +6129,7 @@
         <p:spPr>
           <a:xfrm>
             <a:off x="4477680" y="6356520"/>
-            <a:ext cx="3236400" cy="364320"/>
+            <a:ext cx="3236040" cy="363960"/>
           </a:xfrm>
           <a:prstGeom prst="rect">
             <a:avLst/>
@@ -6218,7 +6218,7 @@
         <p:spPr>
           <a:xfrm>
             <a:off x="0" y="0"/>
-            <a:ext cx="12191400" cy="2264400"/>
+            <a:ext cx="12191040" cy="2264040"/>
           </a:xfrm>
           <a:prstGeom prst="rect">
             <a:avLst/>
@@ -6278,7 +6278,7 @@
         <p:spPr>
           <a:xfrm>
             <a:off x="4657320" y="0"/>
-            <a:ext cx="7534080" cy="6857280"/>
+            <a:ext cx="7533720" cy="6856920"/>
           </a:xfrm>
           <a:prstGeom prst="rect">
             <a:avLst/>
@@ -6332,7 +6332,7 @@
         <p:spPr>
           <a:xfrm>
             <a:off x="960480" y="6356520"/>
-            <a:ext cx="4980960" cy="364320"/>
+            <a:ext cx="4980600" cy="363960"/>
           </a:xfrm>
           <a:prstGeom prst="rect">
             <a:avLst/>
@@ -6359,7 +6359,7 @@
               </a:lnSpc>
             </a:pPr>
             <a:r>
-              <a:rPr b="0" lang="en-US" sz="1100" spc="46" strike="noStrike" cap="all">
+              <a:rPr b="0" lang="en-US" sz="1100" spc="43" strike="noStrike" cap="all">
                 <a:solidFill>
                   <a:schemeClr val="lt1"/>
                 </a:solidFill>
@@ -6389,7 +6389,7 @@
         <p:spPr>
           <a:xfrm>
             <a:off x="10296000" y="6356520"/>
-            <a:ext cx="932040" cy="364320"/>
+            <a:ext cx="931680" cy="363960"/>
           </a:xfrm>
           <a:prstGeom prst="rect">
             <a:avLst/>
@@ -6430,7 +6430,7 @@
                 <a:tab algn="l" pos="0"/>
               </a:tabLst>
             </a:pPr>
-            <a:fld id="{F57CE80C-BD44-43C3-B8AE-BDF64C413478}" type="slidenum">
+            <a:fld id="{EAC8FAEE-811E-4C7A-93EF-A7111A423BE1}" type="slidenum">
               <a:rPr b="0" lang="en-US" sz="1200" spc="-1" strike="noStrike">
                 <a:solidFill>
                   <a:schemeClr val="lt1"/>
@@ -6461,7 +6461,7 @@
         <p:spPr>
           <a:xfrm>
             <a:off x="6903720" y="6356520"/>
-            <a:ext cx="3236400" cy="364320"/>
+            <a:ext cx="3236040" cy="363960"/>
           </a:xfrm>
           <a:prstGeom prst="rect">
             <a:avLst/>
@@ -6550,7 +6550,7 @@
         <p:spPr>
           <a:xfrm>
             <a:off x="0" y="0"/>
-            <a:ext cx="12191400" cy="2264400"/>
+            <a:ext cx="12191040" cy="2264040"/>
           </a:xfrm>
           <a:prstGeom prst="rect">
             <a:avLst/>
@@ -6608,7 +6608,7 @@
         <p:spPr>
           <a:xfrm>
             <a:off x="960120" y="6356520"/>
-            <a:ext cx="3417120" cy="364320"/>
+            <a:ext cx="3416760" cy="363960"/>
           </a:xfrm>
           <a:prstGeom prst="rect">
             <a:avLst/>
@@ -6680,7 +6680,7 @@
         <p:spPr>
           <a:xfrm>
             <a:off x="10296000" y="6356520"/>
-            <a:ext cx="932040" cy="364320"/>
+            <a:ext cx="931680" cy="363960"/>
           </a:xfrm>
           <a:prstGeom prst="rect">
             <a:avLst/>
@@ -6721,7 +6721,7 @@
                 <a:tab algn="l" pos="0"/>
               </a:tabLst>
             </a:pPr>
-            <a:fld id="{67DE5D88-C0E5-455B-B75C-270EC8CD5AC4}" type="slidenum">
+            <a:fld id="{5244B53F-78D1-4B64-9919-A5C99280BFEF}" type="slidenum">
               <a:rPr b="0" lang="en-US" sz="1200" spc="-1" strike="noStrike">
                 <a:solidFill>
                   <a:schemeClr val="dk1"/>
@@ -6752,7 +6752,7 @@
         <p:spPr>
           <a:xfrm>
             <a:off x="4477680" y="6356520"/>
-            <a:ext cx="3236400" cy="364320"/>
+            <a:ext cx="3236040" cy="363960"/>
           </a:xfrm>
           <a:prstGeom prst="rect">
             <a:avLst/>
@@ -6838,7 +6838,7 @@
         <p:spPr>
           <a:xfrm>
             <a:off x="547200" y="536040"/>
-            <a:ext cx="6388200" cy="5601240"/>
+            <a:ext cx="6387840" cy="5600880"/>
           </a:xfrm>
           <a:prstGeom prst="rect">
             <a:avLst/>
@@ -6869,7 +6869,7 @@
               </a:tabLst>
             </a:pPr>
             <a:r>
-              <a:rPr b="0" lang="en-US" sz="8000" spc="114" strike="noStrike" cap="all">
+              <a:rPr b="0" lang="en-US" sz="8000" spc="111" strike="noStrike" cap="all">
                 <a:solidFill>
                   <a:srgbClr val="ffffff"/>
                 </a:solidFill>
@@ -6900,7 +6900,7 @@
         <p:spPr>
           <a:xfrm>
             <a:off x="8029800" y="627120"/>
-            <a:ext cx="3198240" cy="5590080"/>
+            <a:ext cx="3197880" cy="5589720"/>
           </a:xfrm>
           <a:prstGeom prst="rect">
             <a:avLst/>
@@ -6931,7 +6931,7 @@
               </a:tabLst>
             </a:pPr>
             <a:r>
-              <a:rPr b="0" lang="en-US" sz="2600" spc="46" strike="noStrike">
+              <a:rPr b="0" lang="en-US" sz="2600" spc="43" strike="noStrike">
                 <a:solidFill>
                   <a:schemeClr val="dk1"/>
                 </a:solidFill>
@@ -6963,7 +6963,7 @@
               </a:tabLst>
             </a:pPr>
             <a:r>
-              <a:rPr b="0" lang="en-US" sz="1600" spc="46" strike="noStrike">
+              <a:rPr b="0" lang="en-US" sz="1600" spc="43" strike="noStrike">
                 <a:solidFill>
                   <a:schemeClr val="dk1"/>
                 </a:solidFill>
@@ -6993,7 +6993,7 @@
         <p:spPr>
           <a:xfrm>
             <a:off x="914400" y="2819880"/>
-            <a:ext cx="2437920" cy="2437920"/>
+            <a:ext cx="2437560" cy="2437560"/>
           </a:xfrm>
           <a:prstGeom prst="rect">
             <a:avLst/>
@@ -7046,7 +7046,7 @@
         <p:spPr>
           <a:xfrm>
             <a:off x="966240" y="336960"/>
-            <a:ext cx="10615320" cy="1699920"/>
+            <a:ext cx="10614960" cy="1699560"/>
           </a:xfrm>
           <a:prstGeom prst="rect">
             <a:avLst/>
@@ -7077,7 +7077,7 @@
               </a:tabLst>
             </a:pPr>
             <a:r>
-              <a:rPr b="0" lang="en-US" sz="6600" spc="114" strike="noStrike" cap="all">
+              <a:rPr b="0" lang="en-US" sz="6600" spc="111" strike="noStrike" cap="all">
                 <a:solidFill>
                   <a:schemeClr val="dk1"/>
                 </a:solidFill>
@@ -7107,7 +7107,7 @@
         <p:spPr>
           <a:xfrm>
             <a:off x="820800" y="2212200"/>
-            <a:ext cx="4436640" cy="3257280"/>
+            <a:ext cx="4436280" cy="3256920"/>
           </a:xfrm>
           <a:prstGeom prst="rect">
             <a:avLst/>
@@ -7138,7 +7138,7 @@
               </a:tabLst>
             </a:pPr>
             <a:r>
-              <a:rPr b="0" lang="en-US" sz="2600" spc="46" strike="noStrike">
+              <a:rPr b="0" lang="en-US" sz="2600" spc="43" strike="noStrike">
                 <a:solidFill>
                   <a:srgbClr val="ffffff"/>
                 </a:solidFill>
@@ -7171,7 +7171,7 @@
               </a:tabLst>
             </a:pPr>
             <a:r>
-              <a:rPr b="0" lang="en-US" sz="2600" spc="46" strike="noStrike">
+              <a:rPr b="0" lang="en-US" sz="2600" spc="43" strike="noStrike">
                 <a:solidFill>
                   <a:schemeClr val="lt1"/>
                 </a:solidFill>
@@ -7204,7 +7204,7 @@
               </a:tabLst>
             </a:pPr>
             <a:r>
-              <a:rPr b="0" lang="en-US" sz="2600" spc="46" strike="noStrike">
+              <a:rPr b="0" lang="en-US" sz="2600" spc="43" strike="noStrike">
                 <a:solidFill>
                   <a:schemeClr val="lt1"/>
                 </a:solidFill>
@@ -7237,7 +7237,7 @@
               </a:tabLst>
             </a:pPr>
             <a:r>
-              <a:rPr b="0" lang="en-US" sz="2600" spc="46" strike="noStrike">
+              <a:rPr b="0" lang="en-US" sz="2600" spc="43" strike="noStrike">
                 <a:solidFill>
                   <a:schemeClr val="lt1"/>
                 </a:solidFill>
@@ -7268,7 +7268,7 @@
         <p:spPr>
           <a:xfrm>
             <a:off x="5297760" y="2265480"/>
-            <a:ext cx="3478680" cy="3950640"/>
+            <a:ext cx="3478320" cy="3950280"/>
           </a:xfrm>
           <a:prstGeom prst="rect">
             <a:avLst/>
@@ -7291,7 +7291,7 @@
         <p:spPr>
           <a:xfrm>
             <a:off x="8777160" y="2265480"/>
-            <a:ext cx="3413880" cy="3950640"/>
+            <a:ext cx="3413520" cy="3950280"/>
           </a:xfrm>
           <a:prstGeom prst="rect">
             <a:avLst/>
@@ -7301,6 +7301,77 @@
           </a:ln>
         </p:spPr>
       </p:pic>
+      <p:sp>
+        <p:nvSpPr>
+          <p:cNvPr id="78" name=""/>
+          <p:cNvSpPr txBox="1"/>
+          <p:nvPr/>
+        </p:nvSpPr>
+        <p:spPr>
+          <a:xfrm>
+            <a:off x="0" y="6256800"/>
+            <a:ext cx="12115800" cy="457200"/>
+          </a:xfrm>
+          <a:prstGeom prst="rect">
+            <a:avLst/>
+          </a:prstGeom>
+          <a:noFill/>
+          <a:ln w="0">
+            <a:noFill/>
+          </a:ln>
+        </p:spPr>
+        <p:txBody>
+          <a:bodyPr lIns="90000" rIns="90000" tIns="45000" bIns="45000" anchor="t">
+            <a:noAutofit/>
+          </a:bodyPr>
+          <a:p>
+            <a:pPr algn="ctr"/>
+            <a:r>
+              <a:rPr b="1" lang="en-US" sz="2200" spc="-1" strike="noStrike">
+                <a:solidFill>
+                  <a:srgbClr val="666666"/>
+                </a:solidFill>
+                <a:latin typeface="Arial"/>
+              </a:rPr>
+              <a:t>GITHUB</a:t>
+            </a:r>
+            <a:r>
+              <a:rPr b="1" lang="en-US" sz="2200" spc="-1" strike="noStrike">
+                <a:solidFill>
+                  <a:srgbClr val="000000"/>
+                </a:solidFill>
+                <a:latin typeface="Arial"/>
+              </a:rPr>
+              <a:t> [ </a:t>
+            </a:r>
+            <a:r>
+              <a:rPr b="1" lang="en-US" sz="2200" spc="-1" strike="noStrike">
+                <a:solidFill>
+                  <a:srgbClr val="000000"/>
+                </a:solidFill>
+                <a:latin typeface="Arial"/>
+                <a:hlinkClick r:id="rId3"/>
+              </a:rPr>
+              <a:t>https://github.com/roberto-chan/bicep-intro</a:t>
+            </a:r>
+            <a:r>
+              <a:rPr b="1" lang="en-US" sz="2200" spc="-1" strike="noStrike">
+                <a:solidFill>
+                  <a:srgbClr val="000000"/>
+                </a:solidFill>
+                <a:latin typeface="Arial"/>
+              </a:rPr>
+              <a:t> ]</a:t>
+            </a:r>
+            <a:endParaRPr b="1" lang="en-US" sz="2200" spc="-1" strike="noStrike">
+              <a:solidFill>
+                <a:srgbClr val="000000"/>
+              </a:solidFill>
+              <a:latin typeface="Arial"/>
+            </a:endParaRPr>
+          </a:p>
+        </p:txBody>
+      </p:sp>
     </p:spTree>
   </p:cSld>
   <mc:AlternateContent>
@@ -7333,7 +7404,7 @@
       </p:grpSpPr>
       <p:pic>
         <p:nvPicPr>
-          <p:cNvPr id="78" name="Picture Placeholder 14" descr="A brick wall with a word painted on it"/>
+          <p:cNvPr id="79" name="Picture Placeholder 14" descr="A brick wall with a word painted on it"/>
           <p:cNvPicPr/>
           <p:nvPr/>
         </p:nvPicPr>
@@ -7344,7 +7415,7 @@
         <p:spPr>
           <a:xfrm>
             <a:off x="6094440" y="0"/>
-            <a:ext cx="3045600" cy="3427560"/>
+            <a:ext cx="3045240" cy="3427200"/>
           </a:xfrm>
           <a:prstGeom prst="rect">
             <a:avLst/>
@@ -7356,7 +7427,7 @@
       </p:pic>
       <p:pic>
         <p:nvPicPr>
-          <p:cNvPr id="79" name="Picture Placeholder 18" descr="A close-up of a building black and white"/>
+          <p:cNvPr id="80" name="Picture Placeholder 18" descr="A close-up of a building black and white"/>
           <p:cNvPicPr/>
           <p:nvPr/>
         </p:nvPicPr>
@@ -7367,7 +7438,7 @@
         <p:spPr>
           <a:xfrm>
             <a:off x="9148680" y="0"/>
-            <a:ext cx="3047400" cy="3428280"/>
+            <a:ext cx="3047040" cy="3427920"/>
           </a:xfrm>
           <a:prstGeom prst="rect">
             <a:avLst/>
@@ -7379,7 +7450,7 @@
       </p:pic>
       <p:pic>
         <p:nvPicPr>
-          <p:cNvPr id="80" name="Picture Placeholder 20" descr="Picture of a train going through a city "/>
+          <p:cNvPr id="81" name="Picture Placeholder 20" descr="Picture of a train going through a city "/>
           <p:cNvPicPr/>
           <p:nvPr/>
         </p:nvPicPr>
@@ -7390,7 +7461,7 @@
         <p:spPr>
           <a:xfrm>
             <a:off x="6102360" y="3429000"/>
-            <a:ext cx="6076080" cy="3428280"/>
+            <a:ext cx="6075720" cy="3427920"/>
           </a:xfrm>
           <a:prstGeom prst="rect">
             <a:avLst/>
@@ -7402,7 +7473,7 @@
       </p:pic>
       <p:sp>
         <p:nvSpPr>
-          <p:cNvPr id="81" name="PlaceHolder 1"/>
+          <p:cNvPr id="82" name="PlaceHolder 1"/>
           <p:cNvSpPr>
             <a:spLocks noGrp="1"/>
           </p:cNvSpPr>
@@ -7413,7 +7484,7 @@
         <p:spPr>
           <a:xfrm>
             <a:off x="1800" y="317520"/>
-            <a:ext cx="6097680" cy="1406520"/>
+            <a:ext cx="6097320" cy="1406160"/>
           </a:xfrm>
           <a:prstGeom prst="rect">
             <a:avLst/>
@@ -7444,7 +7515,7 @@
               </a:tabLst>
             </a:pPr>
             <a:r>
-              <a:rPr b="0" lang="en-US" sz="5400" spc="114" strike="noStrike" cap="all">
+              <a:rPr b="0" lang="en-US" sz="5400" spc="111" strike="noStrike" cap="all">
                 <a:solidFill>
                   <a:schemeClr val="lt1"/>
                 </a:solidFill>
@@ -7463,14 +7534,14 @@
       </p:sp>
       <p:sp>
         <p:nvSpPr>
-          <p:cNvPr id="82" name="TextBox 33"/>
+          <p:cNvPr id="83" name="TextBox 33"/>
           <p:cNvSpPr/>
           <p:nvPr/>
         </p:nvSpPr>
         <p:spPr>
           <a:xfrm>
             <a:off x="336600" y="-3455640"/>
-            <a:ext cx="7583760" cy="363960"/>
+            <a:ext cx="7583400" cy="363960"/>
           </a:xfrm>
           <a:prstGeom prst="rect">
             <a:avLst/>
@@ -7518,14 +7589,14 @@
       </p:sp>
       <p:sp>
         <p:nvSpPr>
-          <p:cNvPr id="83" name="Content Placeholder 1"/>
+          <p:cNvPr id="84" name="Content Placeholder 1"/>
           <p:cNvSpPr/>
           <p:nvPr/>
         </p:nvSpPr>
         <p:spPr>
           <a:xfrm>
             <a:off x="482400" y="2047680"/>
-            <a:ext cx="5003640" cy="3438360"/>
+            <a:ext cx="5003280" cy="3438000"/>
           </a:xfrm>
           <a:prstGeom prst="rect">
             <a:avLst/>
@@ -7561,7 +7632,7 @@
               </a:tabLst>
             </a:pPr>
             <a:r>
-              <a:rPr b="0" lang="en-US" sz="2000" spc="46" strike="noStrike">
+              <a:rPr b="0" lang="en-US" sz="2000" spc="43" strike="noStrike">
                 <a:solidFill>
                   <a:schemeClr val="lt1"/>
                 </a:solidFill>
@@ -7570,7 +7641,7 @@
               <a:t>Hello</a:t>
             </a:r>
             <a:r>
-              <a:rPr b="0" lang="en-US" sz="2000" spc="46" strike="noStrike">
+              <a:rPr b="0" lang="en-US" sz="2000" spc="43" strike="noStrike">
                 <a:solidFill>
                   <a:schemeClr val="lt1"/>
                 </a:solidFill>
@@ -7602,7 +7673,7 @@
               </a:tabLst>
             </a:pPr>
             <a:r>
-              <a:rPr b="0" lang="en-US" sz="2000" spc="46" strike="noStrike">
+              <a:rPr b="0" lang="en-US" sz="2000" spc="43" strike="noStrike">
                 <a:solidFill>
                   <a:schemeClr val="lt1"/>
                 </a:solidFill>
@@ -7652,7 +7723,7 @@
       </p:grpSpPr>
       <p:sp>
         <p:nvSpPr>
-          <p:cNvPr id="84" name="PlaceHolder 1"/>
+          <p:cNvPr id="85" name="PlaceHolder 1"/>
           <p:cNvSpPr>
             <a:spLocks noGrp="1"/>
           </p:cNvSpPr>
@@ -7663,7 +7734,7 @@
         <p:spPr>
           <a:xfrm>
             <a:off x="960120" y="317880"/>
-            <a:ext cx="10267920" cy="1699920"/>
+            <a:ext cx="10267560" cy="1699560"/>
           </a:xfrm>
           <a:prstGeom prst="rect">
             <a:avLst/>
@@ -7688,7 +7759,7 @@
               </a:tabLst>
             </a:pPr>
             <a:r>
-              <a:rPr b="0" lang="en-US" sz="6600" spc="114" strike="noStrike" cap="all">
+              <a:rPr b="0" lang="en-US" sz="6600" spc="111" strike="noStrike" cap="all">
                 <a:solidFill>
                   <a:schemeClr val="lt1"/>
                 </a:solidFill>
@@ -7707,14 +7778,14 @@
       </p:sp>
       <p:sp>
         <p:nvSpPr>
-          <p:cNvPr id="85" name=""/>
+          <p:cNvPr id="86" name=""/>
           <p:cNvSpPr/>
           <p:nvPr/>
         </p:nvSpPr>
         <p:spPr>
           <a:xfrm>
             <a:off x="228600" y="2359440"/>
-            <a:ext cx="11429640" cy="1369800"/>
+            <a:ext cx="11429280" cy="1369440"/>
           </a:xfrm>
           <a:prstGeom prst="rect">
             <a:avLst/>
@@ -7760,14 +7831,14 @@
       </p:sp>
       <p:sp>
         <p:nvSpPr>
-          <p:cNvPr id="86" name="Content Placeholder 2"/>
+          <p:cNvPr id="87" name="Content Placeholder 2"/>
           <p:cNvSpPr/>
           <p:nvPr/>
         </p:nvSpPr>
         <p:spPr>
           <a:xfrm>
             <a:off x="228600" y="3594960"/>
-            <a:ext cx="11658240" cy="3034080"/>
+            <a:ext cx="11657880" cy="3033720"/>
           </a:xfrm>
           <a:prstGeom prst="rect">
             <a:avLst/>
@@ -7803,7 +7874,7 @@
               <a:buChar char=""/>
             </a:pPr>
             <a:r>
-              <a:rPr b="0" lang="en-US" sz="2000" spc="46" strike="noStrike">
+              <a:rPr b="0" lang="en-US" sz="2000" spc="43" strike="noStrike">
                 <a:solidFill>
                   <a:schemeClr val="dk1"/>
                 </a:solidFill>
@@ -7834,7 +7905,7 @@
               <a:buChar char=""/>
             </a:pPr>
             <a:r>
-              <a:rPr b="0" lang="en-US" sz="2000" spc="46" strike="noStrike">
+              <a:rPr b="0" lang="en-US" sz="2000" spc="43" strike="noStrike">
                 <a:solidFill>
                   <a:schemeClr val="dk1"/>
                 </a:solidFill>
@@ -7865,7 +7936,7 @@
               <a:buChar char=""/>
             </a:pPr>
             <a:r>
-              <a:rPr b="0" lang="en-US" sz="2000" spc="46" strike="noStrike">
+              <a:rPr b="0" lang="en-US" sz="2000" spc="43" strike="noStrike">
                 <a:solidFill>
                   <a:schemeClr val="dk1"/>
                 </a:solidFill>
@@ -7896,7 +7967,7 @@
               <a:buChar char=""/>
             </a:pPr>
             <a:r>
-              <a:rPr b="0" lang="en-US" sz="2000" spc="46" strike="noStrike">
+              <a:rPr b="0" lang="en-US" sz="2000" spc="43" strike="noStrike">
                 <a:solidFill>
                   <a:schemeClr val="dk1"/>
                 </a:solidFill>
@@ -7945,7 +8016,7 @@
       </p:grpSpPr>
       <p:sp>
         <p:nvSpPr>
-          <p:cNvPr id="87" name="PlaceHolder 1"/>
+          <p:cNvPr id="88" name="PlaceHolder 1"/>
           <p:cNvSpPr>
             <a:spLocks noGrp="1"/>
           </p:cNvSpPr>
@@ -7956,7 +8027,7 @@
         <p:spPr>
           <a:xfrm>
             <a:off x="960120" y="317880"/>
-            <a:ext cx="10267920" cy="1699920"/>
+            <a:ext cx="10267560" cy="1699560"/>
           </a:xfrm>
           <a:prstGeom prst="rect">
             <a:avLst/>
@@ -7981,7 +8052,7 @@
               </a:tabLst>
             </a:pPr>
             <a:r>
-              <a:rPr b="0" lang="en-US" sz="6600" spc="114" strike="noStrike" cap="all">
+              <a:rPr b="0" lang="en-US" sz="6600" spc="111" strike="noStrike" cap="all">
                 <a:solidFill>
                   <a:schemeClr val="lt1"/>
                 </a:solidFill>
@@ -8000,14 +8071,14 @@
       </p:sp>
       <p:sp>
         <p:nvSpPr>
-          <p:cNvPr id="88" name="Content Placeholder 5"/>
+          <p:cNvPr id="89" name="Content Placeholder 5"/>
           <p:cNvSpPr/>
           <p:nvPr/>
         </p:nvSpPr>
         <p:spPr>
           <a:xfrm>
             <a:off x="228600" y="2514600"/>
-            <a:ext cx="11658240" cy="4114440"/>
+            <a:ext cx="11657880" cy="4114080"/>
           </a:xfrm>
           <a:prstGeom prst="rect">
             <a:avLst/>
@@ -8043,11 +8114,12 @@
               <a:buChar char=""/>
             </a:pPr>
             <a:r>
-              <a:rPr b="0" lang="en-US" sz="2000" spc="46" strike="noStrike">
+              <a:rPr b="0" lang="en-US" sz="2000" spc="43" strike="noStrike">
                 <a:solidFill>
                   <a:schemeClr val="dk1"/>
                 </a:solidFill>
                 <a:latin typeface="Franklin Gothic Medium"/>
+                <a:ea typeface="DejaVu Sans"/>
               </a:rPr>
               <a:t>Simplified syntax compared to ARM templates.</a:t>
             </a:r>
@@ -8074,11 +8146,12 @@
               <a:buChar char=""/>
             </a:pPr>
             <a:r>
-              <a:rPr b="0" lang="en-US" sz="2000" spc="46" strike="noStrike">
+              <a:rPr b="0" lang="en-US" sz="2000" spc="43" strike="noStrike">
                 <a:solidFill>
                   <a:schemeClr val="dk1"/>
                 </a:solidFill>
                 <a:latin typeface="Franklin Gothic Medium"/>
+                <a:ea typeface="DejaVu Sans"/>
               </a:rPr>
               <a:t>Bicep uses a cleaner, more human-readable syntax with fewer boilerplate code and curly braces.</a:t>
             </a:r>
@@ -8105,11 +8178,12 @@
               <a:buChar char=""/>
             </a:pPr>
             <a:r>
-              <a:rPr b="0" lang="en-US" sz="2000" spc="46" strike="noStrike">
+              <a:rPr b="0" lang="en-US" sz="2000" spc="43" strike="noStrike">
                 <a:solidFill>
                   <a:schemeClr val="dk1"/>
                 </a:solidFill>
                 <a:latin typeface="Franklin Gothic Medium"/>
+                <a:ea typeface="DejaVu Sans"/>
               </a:rPr>
               <a:t>Improved readability and maintainability.</a:t>
             </a:r>
@@ -8136,11 +8210,12 @@
               <a:buChar char=""/>
             </a:pPr>
             <a:r>
-              <a:rPr b="0" lang="en-US" sz="2000" spc="46" strike="noStrike">
+              <a:rPr b="0" lang="en-US" sz="2000" spc="43" strike="noStrike">
                 <a:solidFill>
                   <a:schemeClr val="dk1"/>
                 </a:solidFill>
                 <a:latin typeface="Franklin Gothic Medium"/>
+                <a:ea typeface="DejaVu Sans"/>
               </a:rPr>
               <a:t>Bicep code is easier to understand, navigate, and modify compared to complex JSON files.</a:t>
             </a:r>
@@ -8167,11 +8242,12 @@
               <a:buChar char=""/>
             </a:pPr>
             <a:r>
-              <a:rPr b="0" lang="en-US" sz="2000" spc="46" strike="noStrike">
+              <a:rPr b="0" lang="en-US" sz="2000" spc="43" strike="noStrike">
                 <a:solidFill>
                   <a:schemeClr val="dk1"/>
                 </a:solidFill>
                 <a:latin typeface="Franklin Gothic Medium"/>
+                <a:ea typeface="DejaVu Sans"/>
               </a:rPr>
               <a:t>Supports reusable modules and configurations.</a:t>
             </a:r>
@@ -8198,11 +8274,12 @@
               <a:buChar char=""/>
             </a:pPr>
             <a:r>
-              <a:rPr b="0" lang="en-US" sz="2000" spc="46" strike="noStrike">
+              <a:rPr b="0" lang="en-US" sz="2000" spc="43" strike="noStrike">
                 <a:solidFill>
                   <a:schemeClr val="dk1"/>
                 </a:solidFill>
                 <a:latin typeface="Franklin Gothic Medium"/>
+                <a:ea typeface="DejaVu Sans"/>
               </a:rPr>
               <a:t>Bicep allows defining reusable modules and configurations, promoting code reuse and modularity.</a:t>
             </a:r>
@@ -8229,11 +8306,12 @@
               <a:buChar char=""/>
             </a:pPr>
             <a:r>
-              <a:rPr b="0" lang="en-US" sz="2000" spc="46" strike="noStrike">
+              <a:rPr b="0" lang="en-US" sz="2000" spc="43" strike="noStrike">
                 <a:solidFill>
                   <a:schemeClr val="dk1"/>
                 </a:solidFill>
                 <a:latin typeface="Franklin Gothic Medium"/>
+                <a:ea typeface="DejaVu Sans"/>
               </a:rPr>
               <a:t>Integrated with Azure CLI and Azure PowerShell.</a:t>
             </a:r>
@@ -8260,11 +8338,12 @@
               <a:buChar char=""/>
             </a:pPr>
             <a:r>
-              <a:rPr b="0" lang="en-US" sz="2000" spc="46" strike="noStrike">
+              <a:rPr b="0" lang="en-US" sz="2000" spc="43" strike="noStrike">
                 <a:solidFill>
                   <a:schemeClr val="dk1"/>
                 </a:solidFill>
                 <a:latin typeface="Franklin Gothic Medium"/>
+                <a:ea typeface="DejaVu Sans"/>
               </a:rPr>
               <a:t>Bicep seamlessly integrates with Azure CLI and PowerShell, enabling easy compilation and deployment of Bicep files.</a:t>
             </a:r>
@@ -8309,7 +8388,7 @@
       </p:grpSpPr>
       <p:sp>
         <p:nvSpPr>
-          <p:cNvPr id="89" name="PlaceHolder 1"/>
+          <p:cNvPr id="90" name="PlaceHolder 1"/>
           <p:cNvSpPr>
             <a:spLocks noGrp="1"/>
           </p:cNvSpPr>
@@ -8320,7 +8399,7 @@
         <p:spPr>
           <a:xfrm>
             <a:off x="960120" y="317880"/>
-            <a:ext cx="10267920" cy="1699920"/>
+            <a:ext cx="10267560" cy="1699560"/>
           </a:xfrm>
           <a:prstGeom prst="rect">
             <a:avLst/>
@@ -8345,7 +8424,7 @@
               </a:tabLst>
             </a:pPr>
             <a:r>
-              <a:rPr b="0" lang="en-US" sz="6600" spc="114" strike="noStrike" cap="all">
+              <a:rPr b="0" lang="en-US" sz="6600" spc="111" strike="noStrike" cap="all">
                 <a:solidFill>
                   <a:schemeClr val="lt1"/>
                 </a:solidFill>
@@ -8364,14 +8443,14 @@
       </p:sp>
       <p:sp>
         <p:nvSpPr>
-          <p:cNvPr id="90" name=""/>
+          <p:cNvPr id="91" name=""/>
           <p:cNvSpPr/>
           <p:nvPr/>
         </p:nvSpPr>
         <p:spPr>
           <a:xfrm>
             <a:off x="367920" y="2324520"/>
-            <a:ext cx="9461520" cy="3161520"/>
+            <a:ext cx="9461160" cy="3161160"/>
           </a:xfrm>
           <a:prstGeom prst="rect">
             <a:avLst/>
@@ -8403,6 +8482,7 @@
                   <a:srgbClr val="000000"/>
                 </a:solidFill>
                 <a:latin typeface="Arial"/>
+                <a:ea typeface="DejaVu Sans"/>
               </a:rPr>
               <a:t>targetScope = 'subscription'</a:t>
             </a:r>
@@ -8438,6 +8518,7 @@
                   <a:srgbClr val="000000"/>
                 </a:solidFill>
                 <a:latin typeface="Arial"/>
+                <a:ea typeface="DejaVu Sans"/>
               </a:rPr>
               <a:t>@description('Name of the resource group to create.')</a:t>
             </a:r>
@@ -8460,6 +8541,7 @@
                   <a:srgbClr val="000000"/>
                 </a:solidFill>
                 <a:latin typeface="Arial"/>
+                <a:ea typeface="DejaVu Sans"/>
               </a:rPr>
               <a:t>param rgName string</a:t>
             </a:r>
@@ -8495,6 +8577,7 @@
                   <a:srgbClr val="000000"/>
                 </a:solidFill>
                 <a:latin typeface="Arial"/>
+                <a:ea typeface="DejaVu Sans"/>
               </a:rPr>
               <a:t>@description('Azure Region the resource group will be created in.')</a:t>
             </a:r>
@@ -8517,6 +8600,7 @@
                   <a:srgbClr val="000000"/>
                 </a:solidFill>
                 <a:latin typeface="Arial"/>
+                <a:ea typeface="DejaVu Sans"/>
               </a:rPr>
               <a:t>param rgLocation string = deployment().location</a:t>
             </a:r>
@@ -8552,6 +8636,7 @@
                   <a:srgbClr val="000000"/>
                 </a:solidFill>
                 <a:latin typeface="Arial"/>
+                <a:ea typeface="DejaVu Sans"/>
               </a:rPr>
               <a:t>resource resourceGroup 'Microsoft.Resources/resourceGroups@2022-09-01' = {</a:t>
             </a:r>
@@ -8574,6 +8659,7 @@
                   <a:srgbClr val="000000"/>
                 </a:solidFill>
                 <a:latin typeface="Arial"/>
+                <a:ea typeface="DejaVu Sans"/>
               </a:rPr>
               <a:t>  </a:t>
             </a:r>
@@ -8583,6 +8669,7 @@
                   <a:srgbClr val="000000"/>
                 </a:solidFill>
                 <a:latin typeface="Arial"/>
+                <a:ea typeface="DejaVu Sans"/>
               </a:rPr>
               <a:t>name: rgName</a:t>
             </a:r>
@@ -8605,6 +8692,7 @@
                   <a:srgbClr val="000000"/>
                 </a:solidFill>
                 <a:latin typeface="Arial"/>
+                <a:ea typeface="DejaVu Sans"/>
               </a:rPr>
               <a:t>  </a:t>
             </a:r>
@@ -8614,6 +8702,7 @@
                   <a:srgbClr val="000000"/>
                 </a:solidFill>
                 <a:latin typeface="Arial"/>
+                <a:ea typeface="DejaVu Sans"/>
               </a:rPr>
               <a:t>location: rgLocation</a:t>
             </a:r>
@@ -8636,6 +8725,7 @@
                   <a:srgbClr val="000000"/>
                 </a:solidFill>
                 <a:latin typeface="Arial"/>
+                <a:ea typeface="DejaVu Sans"/>
               </a:rPr>
               <a:t>}</a:t>
             </a:r>
@@ -8650,14 +8740,14 @@
       </p:sp>
       <p:sp>
         <p:nvSpPr>
-          <p:cNvPr id="91" name=""/>
+          <p:cNvPr id="92" name=""/>
           <p:cNvSpPr/>
           <p:nvPr/>
         </p:nvSpPr>
         <p:spPr>
           <a:xfrm>
             <a:off x="385200" y="5735160"/>
-            <a:ext cx="10515240" cy="857880"/>
+            <a:ext cx="10514880" cy="857520"/>
           </a:xfrm>
           <a:prstGeom prst="rect">
             <a:avLst/>
@@ -8689,6 +8779,7 @@
                   <a:srgbClr val="000000"/>
                 </a:solidFill>
                 <a:latin typeface="Arial"/>
+                <a:ea typeface="DejaVu Sans"/>
               </a:rPr>
               <a:t>Referene for Bicep syntax and structure</a:t>
             </a:r>
@@ -8711,6 +8802,7 @@
                   <a:srgbClr val="000000"/>
                 </a:solidFill>
                 <a:latin typeface="Arial"/>
+                <a:ea typeface="DejaVu Sans"/>
               </a:rPr>
               <a:t>https://learn.microsoft.com/en-us/azure/azure-resource-manager/bicep/file</a:t>
             </a:r>
@@ -8768,7 +8860,7 @@
       </p:grpSpPr>
       <p:sp>
         <p:nvSpPr>
-          <p:cNvPr id="92" name="PlaceHolder 1"/>
+          <p:cNvPr id="93" name="PlaceHolder 1"/>
           <p:cNvSpPr>
             <a:spLocks noGrp="1"/>
           </p:cNvSpPr>
@@ -8779,7 +8871,7 @@
         <p:spPr>
           <a:xfrm>
             <a:off x="914400" y="-438840"/>
-            <a:ext cx="5171040" cy="2038680"/>
+            <a:ext cx="5170680" cy="2038320"/>
           </a:xfrm>
           <a:prstGeom prst="rect">
             <a:avLst/>
@@ -8810,7 +8902,7 @@
               </a:tabLst>
             </a:pPr>
             <a:r>
-              <a:rPr b="0" lang="en-US" sz="6600" spc="114" strike="noStrike" cap="all">
+              <a:rPr b="0" lang="en-US" sz="6600" spc="111" strike="noStrike" cap="all">
                 <a:solidFill>
                   <a:schemeClr val="lt1"/>
                 </a:solidFill>
@@ -8829,7 +8921,7 @@
       </p:sp>
       <p:sp>
         <p:nvSpPr>
-          <p:cNvPr id="93" name="PlaceHolder 2"/>
+          <p:cNvPr id="94" name="PlaceHolder 2"/>
           <p:cNvSpPr>
             <a:spLocks noGrp="1"/>
           </p:cNvSpPr>
@@ -8840,7 +8932,7 @@
         <p:spPr>
           <a:xfrm>
             <a:off x="228600" y="1600200"/>
-            <a:ext cx="5714640" cy="4622040"/>
+            <a:ext cx="5714280" cy="4621680"/>
           </a:xfrm>
           <a:prstGeom prst="rect">
             <a:avLst/>
@@ -8871,7 +8963,7 @@
               </a:tabLst>
             </a:pPr>
             <a:r>
-              <a:rPr b="0" lang="en-US" sz="2000" spc="46" strike="noStrike">
+              <a:rPr b="0" lang="en-US" sz="2000" spc="43" strike="noStrike">
                 <a:solidFill>
                   <a:schemeClr val="lt1"/>
                 </a:solidFill>
@@ -8890,7 +8982,7 @@
       </p:sp>
       <p:pic>
         <p:nvPicPr>
-          <p:cNvPr id="94" name="Picture Placeholder 17" descr="A brick wall with a word painted on it"/>
+          <p:cNvPr id="95" name="Picture Placeholder 17" descr="A brick wall with a word painted on it"/>
           <p:cNvPicPr/>
           <p:nvPr/>
         </p:nvPicPr>
@@ -8901,7 +8993,7 @@
         <p:spPr>
           <a:xfrm>
             <a:off x="6742080" y="639720"/>
-            <a:ext cx="2197800" cy="2545560"/>
+            <a:ext cx="2197440" cy="2545200"/>
           </a:xfrm>
           <a:prstGeom prst="rect">
             <a:avLst/>
@@ -8913,7 +9005,7 @@
       </p:pic>
       <p:pic>
         <p:nvPicPr>
-          <p:cNvPr id="95" name="Picture Placeholder 19" descr="A picture containing text, building, outdoor, sky&#10;"/>
+          <p:cNvPr id="96" name="Picture Placeholder 19" descr="A picture containing text, building, outdoor, sky&#10;"/>
           <p:cNvPicPr/>
           <p:nvPr/>
         </p:nvPicPr>
@@ -8924,7 +9016,7 @@
         <p:spPr>
           <a:xfrm>
             <a:off x="9337680" y="638280"/>
-            <a:ext cx="2197800" cy="2545560"/>
+            <a:ext cx="2197440" cy="2545200"/>
           </a:xfrm>
           <a:prstGeom prst="rect">
             <a:avLst/>
@@ -8936,7 +9028,7 @@
       </p:pic>
       <p:pic>
         <p:nvPicPr>
-          <p:cNvPr id="96" name="Picture Placeholder 21" descr="A picture containing building, outdoor, city, line&#10;"/>
+          <p:cNvPr id="97" name="Picture Placeholder 21" descr="A picture containing building, outdoor, city, line&#10;"/>
           <p:cNvPicPr/>
           <p:nvPr/>
         </p:nvPicPr>
@@ -8947,7 +9039,7 @@
         <p:spPr>
           <a:xfrm>
             <a:off x="6742080" y="3668760"/>
-            <a:ext cx="2197800" cy="2553480"/>
+            <a:ext cx="2197440" cy="2553120"/>
           </a:xfrm>
           <a:prstGeom prst="rect">
             <a:avLst/>
@@ -8959,7 +9051,7 @@
       </p:pic>
       <p:pic>
         <p:nvPicPr>
-          <p:cNvPr id="97" name="Picture Placeholder 24" descr="A close-up of a building"/>
+          <p:cNvPr id="98" name="Picture Placeholder 24" descr="A close-up of a building"/>
           <p:cNvPicPr/>
           <p:nvPr/>
         </p:nvPicPr>
@@ -8970,7 +9062,7 @@
         <p:spPr>
           <a:xfrm>
             <a:off x="9337680" y="3668760"/>
-            <a:ext cx="2197800" cy="2545560"/>
+            <a:ext cx="2197440" cy="2545200"/>
           </a:xfrm>
           <a:prstGeom prst="rect">
             <a:avLst/>
@@ -9012,7 +9104,7 @@
       </p:grpSpPr>
       <p:sp>
         <p:nvSpPr>
-          <p:cNvPr id="98" name="PlaceHolder 1"/>
+          <p:cNvPr id="99" name="PlaceHolder 1"/>
           <p:cNvSpPr>
             <a:spLocks noGrp="1"/>
           </p:cNvSpPr>
@@ -9023,7 +9115,7 @@
         <p:spPr>
           <a:xfrm>
             <a:off x="4555080" y="3036600"/>
-            <a:ext cx="7135200" cy="1699920"/>
+            <a:ext cx="7134840" cy="1699560"/>
           </a:xfrm>
           <a:prstGeom prst="rect">
             <a:avLst/>
@@ -9054,7 +9146,7 @@
               </a:tabLst>
             </a:pPr>
             <a:r>
-              <a:rPr b="0" lang="en-US" sz="6600" spc="114" strike="noStrike" cap="all">
+              <a:rPr b="0" lang="en-US" sz="6600" spc="111" strike="noStrike" cap="all">
                 <a:solidFill>
                   <a:schemeClr val="lt1"/>
                 </a:solidFill>
@@ -9073,7 +9165,7 @@
       </p:sp>
       <p:pic>
         <p:nvPicPr>
-          <p:cNvPr id="99" name="Picture Placeholder 26" descr="Image of a typewriter with &quot;The End.&quot; typed on the paper. "/>
+          <p:cNvPr id="100" name="Picture Placeholder 26" descr="Image of a typewriter with &quot;The End.&quot; typed on the paper. "/>
           <p:cNvPicPr/>
           <p:nvPr/>
         </p:nvPicPr>
@@ -9084,7 +9176,7 @@
         <p:spPr>
           <a:xfrm>
             <a:off x="-12960" y="1225440"/>
-            <a:ext cx="4059360" cy="3951000"/>
+            <a:ext cx="4059000" cy="3950640"/>
           </a:xfrm>
           <a:prstGeom prst="rect">
             <a:avLst/>

</xml_diff>